<commit_message>
DRR scheduler code, mid-term presentation, docs
</commit_message>
<xml_diff>
--- a/Submission/QueueScheduling_MidTerm_Presentation.pptx
+++ b/Submission/QueueScheduling_MidTerm_Presentation.pptx
@@ -3140,7 +3140,7 @@
         <p:spPr>
           <a:xfrm>
             <a:off x="1828800" y="3840480"/>
-            <a:ext cx="8534399" cy="1015663"/>
+            <a:ext cx="8534399" cy="1692771"/>
           </a:xfrm>
         </p:spPr>
         <p:txBody>
@@ -3151,13 +3151,29 @@
               <a:rPr lang="en-IN" dirty="0">
                 <a:latin typeface="+mn-lt"/>
               </a:rPr>
-              <a:t>Anukriti Shrimal</a:t>
+              <a:t>Mid-term presentation</a:t>
             </a:r>
           </a:p>
           <a:p>
             <a:endParaRPr lang="en-IN" dirty="0">
               <a:latin typeface="+mn-lt"/>
             </a:endParaRPr>
+          </a:p>
+          <a:p>
+            <a:r>
+              <a:rPr lang="en-IN" dirty="0">
+                <a:latin typeface="+mn-lt"/>
+              </a:rPr>
+              <a:t>Anukriti Shrimal</a:t>
+            </a:r>
+          </a:p>
+          <a:p>
+            <a:r>
+              <a:rPr lang="en-IN" dirty="0">
+                <a:latin typeface="+mn-lt"/>
+              </a:rPr>
+              <a:t>Ahana Mallik</a:t>
+            </a:r>
           </a:p>
           <a:p>
             <a:r>
@@ -3969,7 +3985,7 @@
         <p:spPr>
           <a:xfrm>
             <a:off x="706961" y="1780160"/>
-            <a:ext cx="9643269" cy="4093428"/>
+            <a:ext cx="9643269" cy="4431983"/>
           </a:xfrm>
           <a:prstGeom prst="rect">
             <a:avLst/>
@@ -3986,7 +4002,36 @@
               <a:rPr lang="en-IN" sz="2200" dirty="0">
                 <a:cs typeface="Arial" panose="020B0604020202020204" pitchFamily="34" charset="0"/>
               </a:rPr>
-              <a:t>Performance evaluation of different queue scheduling algorithms:</a:t>
+              <a:t>Performance evaluation of different queue scheduling algorithms using </a:t>
+            </a:r>
+            <a:br>
+              <a:rPr lang="en-IN" sz="2200" dirty="0">
+                <a:cs typeface="Arial" panose="020B0604020202020204" pitchFamily="34" charset="0"/>
+              </a:rPr>
+            </a:br>
+            <a:r>
+              <a:rPr lang="en-IN" sz="2200" dirty="0" err="1">
+                <a:cs typeface="Arial" panose="020B0604020202020204" pitchFamily="34" charset="0"/>
+              </a:rPr>
+              <a:t>OMNet</a:t>
+            </a:r>
+            <a:r>
+              <a:rPr lang="en-IN" sz="2200" dirty="0">
+                <a:cs typeface="Arial" panose="020B0604020202020204" pitchFamily="34" charset="0"/>
+              </a:rPr>
+              <a:t>++ v4.6 and </a:t>
+            </a:r>
+            <a:r>
+              <a:rPr lang="en-IN" sz="2200" dirty="0" err="1">
+                <a:cs typeface="Arial" panose="020B0604020202020204" pitchFamily="34" charset="0"/>
+              </a:rPr>
+              <a:t>inet</a:t>
+            </a:r>
+            <a:r>
+              <a:rPr lang="en-IN" sz="2200">
+                <a:cs typeface="Arial" panose="020B0604020202020204" pitchFamily="34" charset="0"/>
+              </a:rPr>
+              <a:t> v3.2.0:</a:t>
             </a:r>
             <a:br>
               <a:rPr lang="en-IN" sz="2200" dirty="0">
@@ -4935,7 +4980,7 @@
               <a:rPr lang="en-IN" sz="2200" dirty="0">
                 <a:cs typeface="Arial" panose="020B0604020202020204" pitchFamily="34" charset="0"/>
               </a:rPr>
-              <a:t>The performance of the schedulers would be measured using following parameter:</a:t>
+              <a:t>The performance of the schedulers could be measured using following parameters:</a:t>
             </a:r>
           </a:p>
           <a:p>
@@ -4952,7 +4997,7 @@
               <a:rPr lang="en-IN" sz="2200" dirty="0">
                 <a:cs typeface="Arial" panose="020B0604020202020204" pitchFamily="34" charset="0"/>
               </a:rPr>
-              <a:t>Queueing delay: Elapsed time between enqueue and dequeue of packet</a:t>
+              <a:t>Queueing delay: Elapsed time between enqueue and dequeue of packet in router.</a:t>
             </a:r>
           </a:p>
           <a:p>

</xml_diff>